<commit_message>
Slide dump after CodeCampNYC
</commit_message>
<xml_diff>
--- a/AndroidStudio.pptx
+++ b/AndroidStudio.pptx
@@ -5,17 +5,18 @@
     <p:sldMasterId id="2147483648" r:id="rId1"/>
   </p:sldMasterIdLst>
   <p:notesMasterIdLst>
-    <p:notesMasterId r:id="rId10"/>
+    <p:notesMasterId r:id="rId11"/>
   </p:notesMasterIdLst>
   <p:sldIdLst>
     <p:sldId id="265" r:id="rId2"/>
     <p:sldId id="257" r:id="rId3"/>
     <p:sldId id="258" r:id="rId4"/>
     <p:sldId id="259" r:id="rId5"/>
-    <p:sldId id="260" r:id="rId6"/>
-    <p:sldId id="261" r:id="rId7"/>
-    <p:sldId id="262" r:id="rId8"/>
-    <p:sldId id="263" r:id="rId9"/>
+    <p:sldId id="266" r:id="rId6"/>
+    <p:sldId id="260" r:id="rId7"/>
+    <p:sldId id="261" r:id="rId8"/>
+    <p:sldId id="262" r:id="rId9"/>
+    <p:sldId id="263" r:id="rId10"/>
   </p:sldIdLst>
   <p:sldSz cx="9144000" cy="6858000" type="screen4x3"/>
   <p:notesSz cx="6858000" cy="9144000"/>
@@ -199,7 +200,7 @@
           <a:p>
             <a:fld id="{11C2DAAB-46CC-784A-81B6-C38A03E8356B}" type="datetimeFigureOut">
               <a:rPr lang="en-US" smtClean="0"/>
-              <a:t>5/27/14</a:t>
+              <a:t>9/2/14</a:t>
             </a:fld>
             <a:endParaRPr lang="en-US"/>
           </a:p>
@@ -787,7 +788,7 @@
           <a:p>
             <a:fld id="{7321EE09-FA90-0547-9F46-B1FD4B12DD1D}" type="slidenum">
               <a:rPr lang="en-US" smtClean="0"/>
-              <a:t>8</a:t>
+              <a:t>9</a:t>
             </a:fld>
             <a:endParaRPr lang="en-US"/>
           </a:p>
@@ -987,7 +988,7 @@
           <a:p>
             <a:fld id="{C5667479-014A-3C46-806D-E5FEFF507D14}" type="datetimeFigureOut">
               <a:rPr lang="en-US" smtClean="0"/>
-              <a:t>5/27/14</a:t>
+              <a:t>9/2/14</a:t>
             </a:fld>
             <a:endParaRPr lang="en-US"/>
           </a:p>
@@ -1157,7 +1158,7 @@
           <a:p>
             <a:fld id="{C5667479-014A-3C46-806D-E5FEFF507D14}" type="datetimeFigureOut">
               <a:rPr lang="en-US" smtClean="0"/>
-              <a:t>5/27/14</a:t>
+              <a:t>9/2/14</a:t>
             </a:fld>
             <a:endParaRPr lang="en-US"/>
           </a:p>
@@ -1337,7 +1338,7 @@
           <a:p>
             <a:fld id="{C5667479-014A-3C46-806D-E5FEFF507D14}" type="datetimeFigureOut">
               <a:rPr lang="en-US" smtClean="0"/>
-              <a:t>5/27/14</a:t>
+              <a:t>9/2/14</a:t>
             </a:fld>
             <a:endParaRPr lang="en-US"/>
           </a:p>
@@ -1507,7 +1508,7 @@
           <a:p>
             <a:fld id="{C5667479-014A-3C46-806D-E5FEFF507D14}" type="datetimeFigureOut">
               <a:rPr lang="en-US" smtClean="0"/>
-              <a:t>5/27/14</a:t>
+              <a:t>9/2/14</a:t>
             </a:fld>
             <a:endParaRPr lang="en-US"/>
           </a:p>
@@ -1753,7 +1754,7 @@
           <a:p>
             <a:fld id="{C5667479-014A-3C46-806D-E5FEFF507D14}" type="datetimeFigureOut">
               <a:rPr lang="en-US" smtClean="0"/>
-              <a:t>5/27/14</a:t>
+              <a:t>9/2/14</a:t>
             </a:fld>
             <a:endParaRPr lang="en-US"/>
           </a:p>
@@ -2041,7 +2042,7 @@
           <a:p>
             <a:fld id="{C5667479-014A-3C46-806D-E5FEFF507D14}" type="datetimeFigureOut">
               <a:rPr lang="en-US" smtClean="0"/>
-              <a:t>5/27/14</a:t>
+              <a:t>9/2/14</a:t>
             </a:fld>
             <a:endParaRPr lang="en-US"/>
           </a:p>
@@ -2463,7 +2464,7 @@
           <a:p>
             <a:fld id="{C5667479-014A-3C46-806D-E5FEFF507D14}" type="datetimeFigureOut">
               <a:rPr lang="en-US" smtClean="0"/>
-              <a:t>5/27/14</a:t>
+              <a:t>9/2/14</a:t>
             </a:fld>
             <a:endParaRPr lang="en-US"/>
           </a:p>
@@ -2581,7 +2582,7 @@
           <a:p>
             <a:fld id="{C5667479-014A-3C46-806D-E5FEFF507D14}" type="datetimeFigureOut">
               <a:rPr lang="en-US" smtClean="0"/>
-              <a:t>5/27/14</a:t>
+              <a:t>9/2/14</a:t>
             </a:fld>
             <a:endParaRPr lang="en-US"/>
           </a:p>
@@ -2676,7 +2677,7 @@
           <a:p>
             <a:fld id="{C5667479-014A-3C46-806D-E5FEFF507D14}" type="datetimeFigureOut">
               <a:rPr lang="en-US" smtClean="0"/>
-              <a:t>5/27/14</a:t>
+              <a:t>9/2/14</a:t>
             </a:fld>
             <a:endParaRPr lang="en-US"/>
           </a:p>
@@ -2953,7 +2954,7 @@
           <a:p>
             <a:fld id="{C5667479-014A-3C46-806D-E5FEFF507D14}" type="datetimeFigureOut">
               <a:rPr lang="en-US" smtClean="0"/>
-              <a:t>5/27/14</a:t>
+              <a:t>9/2/14</a:t>
             </a:fld>
             <a:endParaRPr lang="en-US"/>
           </a:p>
@@ -3206,7 +3207,7 @@
           <a:p>
             <a:fld id="{C5667479-014A-3C46-806D-E5FEFF507D14}" type="datetimeFigureOut">
               <a:rPr lang="en-US" smtClean="0"/>
-              <a:t>5/27/14</a:t>
+              <a:t>9/2/14</a:t>
             </a:fld>
             <a:endParaRPr lang="en-US"/>
           </a:p>
@@ -3419,7 +3420,7 @@
           <a:p>
             <a:fld id="{C5667479-014A-3C46-806D-E5FEFF507D14}" type="datetimeFigureOut">
               <a:rPr lang="en-US" smtClean="0"/>
-              <a:t>5/27/14</a:t>
+              <a:t>9/2/14</a:t>
             </a:fld>
             <a:endParaRPr lang="en-US"/>
           </a:p>
@@ -3869,11 +3870,6 @@
               </a:rPr>
               <a:t>Rocking Out with Android Studio</a:t>
             </a:r>
-            <a:endParaRPr lang="en-US" dirty="0">
-              <a:solidFill>
-                <a:schemeClr val="bg1"/>
-              </a:solidFill>
-            </a:endParaRPr>
           </a:p>
         </p:txBody>
       </p:sp>
@@ -3984,6 +3980,13 @@
   <p:clrMapOvr>
     <a:masterClrMapping/>
   </p:clrMapOvr>
+  <p:timing>
+    <p:tnLst>
+      <p:par>
+        <p:cTn xmlns:p14="http://schemas.microsoft.com/office/powerpoint/2010/main" id="1" dur="indefinite" restart="never" nodeType="tmRoot"/>
+      </p:par>
+    </p:tnLst>
+  </p:timing>
 </p:sld>
 </file>
 
@@ -4307,6 +4310,79 @@
 </file>
 
 <file path=ppt/slides/slide5.xml><?xml version="1.0" encoding="utf-8"?>
+<p:sld xmlns:a="http://schemas.openxmlformats.org/drawingml/2006/main" xmlns:r="http://schemas.openxmlformats.org/officeDocument/2006/relationships" xmlns:p="http://schemas.openxmlformats.org/presentationml/2006/main">
+  <p:cSld>
+    <p:spTree>
+      <p:nvGrpSpPr>
+        <p:cNvPr id="1" name=""/>
+        <p:cNvGrpSpPr/>
+        <p:nvPr/>
+      </p:nvGrpSpPr>
+      <p:grpSpPr>
+        <a:xfrm>
+          <a:off x="0" y="0"/>
+          <a:ext cx="0" cy="0"/>
+          <a:chOff x="0" y="0"/>
+          <a:chExt cx="0" cy="0"/>
+        </a:xfrm>
+      </p:grpSpPr>
+      <p:sp>
+        <p:nvSpPr>
+          <p:cNvPr id="2" name="Title 1"/>
+          <p:cNvSpPr>
+            <a:spLocks noGrp="1"/>
+          </p:cNvSpPr>
+          <p:nvPr>
+            <p:ph type="title"/>
+          </p:nvPr>
+        </p:nvSpPr>
+        <p:spPr>
+          <a:xfrm rot="19758681">
+            <a:off x="8989" y="1843247"/>
+            <a:ext cx="8229600" cy="1143000"/>
+          </a:xfrm>
+        </p:spPr>
+        <p:txBody>
+          <a:bodyPr/>
+          <a:lstStyle/>
+          <a:p>
+            <a:r>
+              <a:rPr lang="en-US" dirty="0" smtClean="0">
+                <a:solidFill>
+                  <a:srgbClr val="FF0000"/>
+                </a:solidFill>
+              </a:rPr>
+              <a:t>Beta!</a:t>
+            </a:r>
+            <a:endParaRPr lang="en-US" dirty="0">
+              <a:solidFill>
+                <a:srgbClr val="FF0000"/>
+              </a:solidFill>
+            </a:endParaRPr>
+          </a:p>
+        </p:txBody>
+      </p:sp>
+    </p:spTree>
+    <p:extLst>
+      <p:ext uri="{BB962C8B-B14F-4D97-AF65-F5344CB8AC3E}">
+        <p14:creationId xmlns:p14="http://schemas.microsoft.com/office/powerpoint/2010/main" val="1952810159"/>
+      </p:ext>
+    </p:extLst>
+  </p:cSld>
+  <p:clrMapOvr>
+    <a:masterClrMapping/>
+  </p:clrMapOvr>
+  <p:timing>
+    <p:tnLst>
+      <p:par>
+        <p:cTn xmlns:p14="http://schemas.microsoft.com/office/powerpoint/2010/main" id="1" dur="indefinite" restart="never" nodeType="tmRoot"/>
+      </p:par>
+    </p:tnLst>
+  </p:timing>
+</p:sld>
+</file>
+
+<file path=ppt/slides/slide6.xml><?xml version="1.0" encoding="utf-8"?>
 <p:sld xmlns:a="http://schemas.openxmlformats.org/drawingml/2006/main" xmlns:r="http://schemas.openxmlformats.org/officeDocument/2006/relationships" xmlns:p="http://schemas.openxmlformats.org/presentationml/2006/main">
   <p:cSld>
     <p:spTree>
@@ -4471,7 +4547,7 @@
 </p:sld>
 </file>
 
-<file path=ppt/slides/slide6.xml><?xml version="1.0" encoding="utf-8"?>
+<file path=ppt/slides/slide7.xml><?xml version="1.0" encoding="utf-8"?>
 <p:sld xmlns:a="http://schemas.openxmlformats.org/drawingml/2006/main" xmlns:r="http://schemas.openxmlformats.org/officeDocument/2006/relationships" xmlns:p="http://schemas.openxmlformats.org/presentationml/2006/main">
   <p:cSld>
     <p:spTree>
@@ -4550,7 +4626,7 @@
 </p:sld>
 </file>
 
-<file path=ppt/slides/slide7.xml><?xml version="1.0" encoding="utf-8"?>
+<file path=ppt/slides/slide8.xml><?xml version="1.0" encoding="utf-8"?>
 <p:sld xmlns:a="http://schemas.openxmlformats.org/drawingml/2006/main" xmlns:r="http://schemas.openxmlformats.org/officeDocument/2006/relationships" xmlns:p="http://schemas.openxmlformats.org/presentationml/2006/main">
   <p:cSld>
     <p:spTree>
@@ -4773,7 +4849,7 @@
 </p:sld>
 </file>
 
-<file path=ppt/slides/slide8.xml><?xml version="1.0" encoding="utf-8"?>
+<file path=ppt/slides/slide9.xml><?xml version="1.0" encoding="utf-8"?>
 <p:sld xmlns:a="http://schemas.openxmlformats.org/drawingml/2006/main" xmlns:r="http://schemas.openxmlformats.org/officeDocument/2006/relationships" xmlns:p="http://schemas.openxmlformats.org/presentationml/2006/main">
   <p:cSld>
     <p:spTree>

</xml_diff>